<commit_message>
Alteração nas referencias e apresentação
</commit_message>
<xml_diff>
--- a/HTML_CSS.pptx
+++ b/HTML_CSS.pptx
@@ -15,6 +15,7 @@
     <p:sldId id="263" r:id="rId9"/>
     <p:sldId id="264" r:id="rId10"/>
     <p:sldId id="265" r:id="rId11"/>
+    <p:sldId id="267" r:id="rId12"/>
   </p:sldIdLst>
   <p:sldSz cx="12192000" cy="6858000"/>
   <p:notesSz cx="6858000" cy="9144000"/>
@@ -867,7 +868,7 @@
             <a:fld id="{B61BEF0D-F0BB-DE4B-95CE-6DB70DBA9567}" type="datetimeFigureOut">
               <a:rPr lang="en-US" dirty="0"/>
               <a:pPr/>
-              <a:t>8/13/2018</a:t>
+              <a:t>8/15/2018</a:t>
             </a:fld>
             <a:endParaRPr lang="en-US" dirty="0"/>
           </a:p>
@@ -1115,7 +1116,7 @@
             <a:fld id="{B61BEF0D-F0BB-DE4B-95CE-6DB70DBA9567}" type="datetimeFigureOut">
               <a:rPr lang="en-US" dirty="0"/>
               <a:pPr/>
-              <a:t>8/13/2018</a:t>
+              <a:t>8/15/2018</a:t>
             </a:fld>
             <a:endParaRPr lang="en-US" dirty="0"/>
           </a:p>
@@ -1426,7 +1427,7 @@
             <a:fld id="{B61BEF0D-F0BB-DE4B-95CE-6DB70DBA9567}" type="datetimeFigureOut">
               <a:rPr lang="en-US" dirty="0"/>
               <a:pPr/>
-              <a:t>8/13/2018</a:t>
+              <a:t>8/15/2018</a:t>
             </a:fld>
             <a:endParaRPr lang="en-US" dirty="0"/>
           </a:p>
@@ -1756,7 +1757,7 @@
             <a:fld id="{B61BEF0D-F0BB-DE4B-95CE-6DB70DBA9567}" type="datetimeFigureOut">
               <a:rPr lang="en-US" dirty="0"/>
               <a:pPr/>
-              <a:t>8/13/2018</a:t>
+              <a:t>8/15/2018</a:t>
             </a:fld>
             <a:endParaRPr lang="en-US" dirty="0"/>
           </a:p>
@@ -2067,7 +2068,7 @@
             <a:fld id="{B61BEF0D-F0BB-DE4B-95CE-6DB70DBA9567}" type="datetimeFigureOut">
               <a:rPr lang="en-US" dirty="0"/>
               <a:pPr/>
-              <a:t>8/13/2018</a:t>
+              <a:t>8/15/2018</a:t>
             </a:fld>
             <a:endParaRPr lang="en-US" dirty="0"/>
           </a:p>
@@ -2457,7 +2458,7 @@
             <a:fld id="{B61BEF0D-F0BB-DE4B-95CE-6DB70DBA9567}" type="datetimeFigureOut">
               <a:rPr lang="en-US" dirty="0"/>
               <a:pPr/>
-              <a:t>8/13/2018</a:t>
+              <a:t>8/15/2018</a:t>
             </a:fld>
             <a:endParaRPr lang="en-US" dirty="0"/>
           </a:p>
@@ -2623,7 +2624,7 @@
           <a:p>
             <a:fld id="{55C6B4A9-1611-4792-9094-5F34BCA07E0B}" type="datetimeFigureOut">
               <a:rPr lang="en-US" dirty="0"/>
-              <a:t>8/13/2018</a:t>
+              <a:t>8/15/2018</a:t>
             </a:fld>
             <a:endParaRPr lang="en-US" dirty="0"/>
           </a:p>
@@ -2799,7 +2800,7 @@
             <a:fld id="{B61BEF0D-F0BB-DE4B-95CE-6DB70DBA9567}" type="datetimeFigureOut">
               <a:rPr lang="en-US" dirty="0"/>
               <a:pPr/>
-              <a:t>8/13/2018</a:t>
+              <a:t>8/15/2018</a:t>
             </a:fld>
             <a:endParaRPr lang="en-US" dirty="0"/>
           </a:p>
@@ -2965,7 +2966,7 @@
           <a:p>
             <a:fld id="{42A54C80-263E-416B-A8E0-580EDEADCBDC}" type="datetimeFigureOut">
               <a:rPr lang="en-US" dirty="0"/>
-              <a:t>8/13/2018</a:t>
+              <a:t>8/15/2018</a:t>
             </a:fld>
             <a:endParaRPr lang="en-US" dirty="0"/>
           </a:p>
@@ -3208,7 +3209,7 @@
             <a:fld id="{B61BEF0D-F0BB-DE4B-95CE-6DB70DBA9567}" type="datetimeFigureOut">
               <a:rPr lang="en-US" dirty="0"/>
               <a:pPr/>
-              <a:t>8/13/2018</a:t>
+              <a:t>8/15/2018</a:t>
             </a:fld>
             <a:endParaRPr lang="en-US" dirty="0"/>
           </a:p>
@@ -3436,7 +3437,7 @@
           <a:p>
             <a:fld id="{42A54C80-263E-416B-A8E0-580EDEADCBDC}" type="datetimeFigureOut">
               <a:rPr lang="en-US" dirty="0"/>
-              <a:t>8/13/2018</a:t>
+              <a:t>8/15/2018</a:t>
             </a:fld>
             <a:endParaRPr lang="en-US" dirty="0"/>
           </a:p>
@@ -3806,7 +3807,7 @@
             <a:fld id="{B61BEF0D-F0BB-DE4B-95CE-6DB70DBA9567}" type="datetimeFigureOut">
               <a:rPr lang="en-US" dirty="0"/>
               <a:pPr/>
-              <a:t>8/13/2018</a:t>
+              <a:t>8/15/2018</a:t>
             </a:fld>
             <a:endParaRPr lang="en-US" dirty="0"/>
           </a:p>
@@ -3926,7 +3927,7 @@
             <a:fld id="{B61BEF0D-F0BB-DE4B-95CE-6DB70DBA9567}" type="datetimeFigureOut">
               <a:rPr lang="en-US" dirty="0"/>
               <a:pPr/>
-              <a:t>8/13/2018</a:t>
+              <a:t>8/15/2018</a:t>
             </a:fld>
             <a:endParaRPr lang="en-US" dirty="0"/>
           </a:p>
@@ -4018,7 +4019,7 @@
             <a:fld id="{B61BEF0D-F0BB-DE4B-95CE-6DB70DBA9567}" type="datetimeFigureOut">
               <a:rPr lang="en-US" dirty="0"/>
               <a:pPr/>
-              <a:t>8/13/2018</a:t>
+              <a:t>8/15/2018</a:t>
             </a:fld>
             <a:endParaRPr lang="en-US" dirty="0"/>
           </a:p>
@@ -4269,7 +4270,7 @@
           <a:p>
             <a:fld id="{42A54C80-263E-416B-A8E0-580EDEADCBDC}" type="datetimeFigureOut">
               <a:rPr lang="en-US" dirty="0"/>
-              <a:t>8/13/2018</a:t>
+              <a:t>8/15/2018</a:t>
             </a:fld>
             <a:endParaRPr lang="en-US" dirty="0"/>
           </a:p>
@@ -4571,7 +4572,7 @@
             <a:fld id="{B61BEF0D-F0BB-DE4B-95CE-6DB70DBA9567}" type="datetimeFigureOut">
               <a:rPr lang="en-US" dirty="0"/>
               <a:pPr/>
-              <a:t>8/13/2018</a:t>
+              <a:t>8/15/2018</a:t>
             </a:fld>
             <a:endParaRPr lang="en-US" dirty="0"/>
           </a:p>
@@ -5269,7 +5270,7 @@
             <a:fld id="{B61BEF0D-F0BB-DE4B-95CE-6DB70DBA9567}" type="datetimeFigureOut">
               <a:rPr lang="en-US" dirty="0"/>
               <a:pPr/>
-              <a:t>8/13/2018</a:t>
+              <a:t>8/15/2018</a:t>
             </a:fld>
             <a:endParaRPr lang="en-US" dirty="0"/>
           </a:p>
@@ -5794,7 +5795,7 @@
           <p:cNvPr id="2" name="Título 1">
             <a:extLst>
               <a:ext uri="{FF2B5EF4-FFF2-40B4-BE49-F238E27FC236}">
-                <a16:creationId xmlns:a16="http://schemas.microsoft.com/office/drawing/2014/main" id="{6677CD1F-49E3-4A24-A81E-A9ADC5459F29}"/>
+                <a16:creationId xmlns:a16="http://schemas.microsoft.com/office/drawing/2014/main" xmlns="" id="{6677CD1F-49E3-4A24-A81E-A9ADC5459F29}"/>
               </a:ext>
             </a:extLst>
           </p:cNvPr>
@@ -5827,7 +5828,7 @@
           <p:cNvPr id="3" name="Subtítulo 2">
             <a:extLst>
               <a:ext uri="{FF2B5EF4-FFF2-40B4-BE49-F238E27FC236}">
-                <a16:creationId xmlns:a16="http://schemas.microsoft.com/office/drawing/2014/main" id="{06F9F868-BB71-4432-8F44-4E8500CC24D5}"/>
+                <a16:creationId xmlns:a16="http://schemas.microsoft.com/office/drawing/2014/main" xmlns="" id="{06F9F868-BB71-4432-8F44-4E8500CC24D5}"/>
               </a:ext>
             </a:extLst>
           </p:cNvPr>
@@ -5882,7 +5883,7 @@
           <p:cNvPr id="2" name="Título 1">
             <a:extLst>
               <a:ext uri="{FF2B5EF4-FFF2-40B4-BE49-F238E27FC236}">
-                <a16:creationId xmlns:a16="http://schemas.microsoft.com/office/drawing/2014/main" id="{FDD4D8AA-BF6D-417E-BD94-283C1C9FCCC9}"/>
+                <a16:creationId xmlns:a16="http://schemas.microsoft.com/office/drawing/2014/main" xmlns="" id="{FDD4D8AA-BF6D-417E-BD94-283C1C9FCCC9}"/>
               </a:ext>
             </a:extLst>
           </p:cNvPr>
@@ -5918,7 +5919,7 @@
           <p:cNvPr id="3" name="Espaço Reservado para Conteúdo 2">
             <a:extLst>
               <a:ext uri="{FF2B5EF4-FFF2-40B4-BE49-F238E27FC236}">
-                <a16:creationId xmlns:a16="http://schemas.microsoft.com/office/drawing/2014/main" id="{E9FA6D06-3B0F-4BE0-981D-B8BAC4217F62}"/>
+                <a16:creationId xmlns:a16="http://schemas.microsoft.com/office/drawing/2014/main" xmlns="" id="{E9FA6D06-3B0F-4BE0-981D-B8BAC4217F62}"/>
               </a:ext>
             </a:extLst>
           </p:cNvPr>
@@ -5957,7 +5958,7 @@
           <p:cNvPr id="5" name="Imagem 4">
             <a:extLst>
               <a:ext uri="{FF2B5EF4-FFF2-40B4-BE49-F238E27FC236}">
-                <a16:creationId xmlns:a16="http://schemas.microsoft.com/office/drawing/2014/main" id="{59879C25-CFF8-48B9-ADBC-975B2E9F29F6}"/>
+                <a16:creationId xmlns:a16="http://schemas.microsoft.com/office/drawing/2014/main" xmlns="" id="{59879C25-CFF8-48B9-ADBC-975B2E9F29F6}"/>
               </a:ext>
             </a:extLst>
           </p:cNvPr>
@@ -5995,6 +5996,161 @@
 </p:sld>
 </file>
 
+<file path=ppt/slides/slide11.xml><?xml version="1.0" encoding="utf-8"?>
+<p:sld xmlns:a="http://schemas.openxmlformats.org/drawingml/2006/main" xmlns:r="http://schemas.openxmlformats.org/officeDocument/2006/relationships" xmlns:p="http://schemas.openxmlformats.org/presentationml/2006/main">
+  <p:cSld>
+    <p:spTree>
+      <p:nvGrpSpPr>
+        <p:cNvPr id="1" name=""/>
+        <p:cNvGrpSpPr/>
+        <p:nvPr/>
+      </p:nvGrpSpPr>
+      <p:grpSpPr>
+        <a:xfrm>
+          <a:off x="0" y="0"/>
+          <a:ext cx="0" cy="0"/>
+          <a:chOff x="0" y="0"/>
+          <a:chExt cx="0" cy="0"/>
+        </a:xfrm>
+      </p:grpSpPr>
+      <p:sp>
+        <p:nvSpPr>
+          <p:cNvPr id="2" name="Título 1"/>
+          <p:cNvSpPr>
+            <a:spLocks noGrp="1"/>
+          </p:cNvSpPr>
+          <p:nvPr>
+            <p:ph type="title"/>
+          </p:nvPr>
+        </p:nvSpPr>
+        <p:spPr/>
+        <p:txBody>
+          <a:bodyPr/>
+          <a:lstStyle/>
+          <a:p>
+            <a:r>
+              <a:rPr lang="pt-BR" dirty="0" smtClean="0"/>
+              <a:t>UX – </a:t>
+            </a:r>
+            <a:r>
+              <a:rPr lang="pt-BR" dirty="0" err="1" smtClean="0"/>
+              <a:t>User</a:t>
+            </a:r>
+            <a:r>
+              <a:rPr lang="pt-BR" dirty="0" smtClean="0"/>
+              <a:t> Experience</a:t>
+            </a:r>
+            <a:endParaRPr lang="pt-BR" dirty="0"/>
+          </a:p>
+        </p:txBody>
+      </p:sp>
+      <p:sp>
+        <p:nvSpPr>
+          <p:cNvPr id="3" name="Espaço Reservado para Conteúdo 2"/>
+          <p:cNvSpPr>
+            <a:spLocks noGrp="1"/>
+          </p:cNvSpPr>
+          <p:nvPr>
+            <p:ph idx="1"/>
+          </p:nvPr>
+        </p:nvSpPr>
+        <p:spPr/>
+        <p:txBody>
+          <a:bodyPr/>
+          <a:lstStyle/>
+          <a:p>
+            <a:r>
+              <a:rPr lang="pt-BR" dirty="0" smtClean="0"/>
+              <a:t>UX significa a relação/experiência que o usuário tem com o produto, serviço, objeto, aplicativo ou software.</a:t>
+            </a:r>
+          </a:p>
+          <a:p>
+            <a:r>
+              <a:rPr lang="pt-BR" dirty="0"/>
+              <a:t>Donald Norman quando era Vice-Presidente do </a:t>
+            </a:r>
+            <a:r>
+              <a:rPr lang="pt-BR" dirty="0" err="1"/>
+              <a:t>Advanced</a:t>
+            </a:r>
+            <a:r>
+              <a:rPr lang="pt-BR" dirty="0"/>
+              <a:t> Technology </a:t>
+            </a:r>
+            <a:r>
+              <a:rPr lang="pt-BR" dirty="0" err="1"/>
+              <a:t>Group</a:t>
+            </a:r>
+            <a:r>
+              <a:rPr lang="pt-BR" dirty="0"/>
+              <a:t> da Apple, Don Norman cunhou o termo “UX”, pois ele acreditava que definições como Interface de Usuário e Usabilidade limitavam o entendimento sobre o que o trabalho dele representava. Então, ele renomeou o seu cargo para “</a:t>
+            </a:r>
+            <a:r>
+              <a:rPr lang="pt-BR" dirty="0" err="1"/>
+              <a:t>User</a:t>
+            </a:r>
+            <a:r>
+              <a:rPr lang="pt-BR" dirty="0"/>
+              <a:t> Experience Architect </a:t>
+            </a:r>
+            <a:r>
+              <a:rPr lang="pt-BR" dirty="0" err="1"/>
+              <a:t>Group</a:t>
+            </a:r>
+            <a:r>
+              <a:rPr lang="pt-BR" dirty="0" smtClean="0"/>
+              <a:t>”.</a:t>
+            </a:r>
+          </a:p>
+          <a:p>
+            <a:r>
+              <a:rPr lang="pt-BR" dirty="0" smtClean="0"/>
+              <a:t>UX traz um conceito que diz que o erro nunca é do usuário e sim do sistema.</a:t>
+            </a:r>
+          </a:p>
+          <a:p>
+            <a:r>
+              <a:rPr lang="pt-BR" dirty="0" smtClean="0"/>
+              <a:t>UX não é UI - </a:t>
+            </a:r>
+            <a:r>
+              <a:rPr lang="pt-BR" dirty="0" err="1" smtClean="0"/>
+              <a:t>User</a:t>
+            </a:r>
+            <a:r>
+              <a:rPr lang="pt-BR" dirty="0" smtClean="0"/>
+              <a:t> Interface e sim uma parte da experiência que o usuário tem.</a:t>
+            </a:r>
+          </a:p>
+          <a:p>
+            <a:r>
+              <a:rPr lang="pt-BR" dirty="0" smtClean="0"/>
+              <a:t>Discussão sobre UX aumentou devido as </a:t>
+            </a:r>
+            <a:r>
+              <a:rPr lang="pt-BR" smtClean="0"/>
+              <a:t>novas facilidades.</a:t>
+            </a:r>
+            <a:endParaRPr lang="pt-BR" dirty="0"/>
+          </a:p>
+          <a:p>
+            <a:endParaRPr lang="pt-BR" dirty="0"/>
+          </a:p>
+        </p:txBody>
+      </p:sp>
+    </p:spTree>
+    <p:extLst>
+      <p:ext uri="{BB962C8B-B14F-4D97-AF65-F5344CB8AC3E}">
+        <p14:creationId xmlns:p14="http://schemas.microsoft.com/office/powerpoint/2010/main" val="1391628220"/>
+      </p:ext>
+    </p:extLst>
+  </p:cSld>
+  <p:clrMapOvr>
+    <a:masterClrMapping/>
+  </p:clrMapOvr>
+</p:sld>
+</file>
+
 <file path=ppt/slides/slide2.xml><?xml version="1.0" encoding="utf-8"?>
 <p:sld xmlns:a="http://schemas.openxmlformats.org/drawingml/2006/main" xmlns:r="http://schemas.openxmlformats.org/officeDocument/2006/relationships" xmlns:p="http://schemas.openxmlformats.org/presentationml/2006/main">
   <p:cSld>
@@ -6017,7 +6173,7 @@
           <p:cNvPr id="2" name="Título 1">
             <a:extLst>
               <a:ext uri="{FF2B5EF4-FFF2-40B4-BE49-F238E27FC236}">
-                <a16:creationId xmlns:a16="http://schemas.microsoft.com/office/drawing/2014/main" id="{9D84EAE9-5767-4D98-89E0-CCACF1F62252}"/>
+                <a16:creationId xmlns:a16="http://schemas.microsoft.com/office/drawing/2014/main" xmlns="" id="{9D84EAE9-5767-4D98-89E0-CCACF1F62252}"/>
               </a:ext>
             </a:extLst>
           </p:cNvPr>
@@ -6053,7 +6209,7 @@
           <p:cNvPr id="5" name="Espaço Reservado para Conteúdo 4">
             <a:extLst>
               <a:ext uri="{FF2B5EF4-FFF2-40B4-BE49-F238E27FC236}">
-                <a16:creationId xmlns:a16="http://schemas.microsoft.com/office/drawing/2014/main" id="{23AA35A2-28FF-433E-86F6-8BEAAC5955D9}"/>
+                <a16:creationId xmlns:a16="http://schemas.microsoft.com/office/drawing/2014/main" xmlns="" id="{23AA35A2-28FF-433E-86F6-8BEAAC5955D9}"/>
               </a:ext>
             </a:extLst>
           </p:cNvPr>
@@ -6082,7 +6238,7 @@
           <p:cNvPr id="8" name="Retângulo 7">
             <a:extLst>
               <a:ext uri="{FF2B5EF4-FFF2-40B4-BE49-F238E27FC236}">
-                <a16:creationId xmlns:a16="http://schemas.microsoft.com/office/drawing/2014/main" id="{7FDE763D-D8C3-4036-9A69-746C03889822}"/>
+                <a16:creationId xmlns:a16="http://schemas.microsoft.com/office/drawing/2014/main" xmlns="" id="{7FDE763D-D8C3-4036-9A69-746C03889822}"/>
               </a:ext>
             </a:extLst>
           </p:cNvPr>
@@ -6167,7 +6323,7 @@
           <p:cNvPr id="2" name="Título 1">
             <a:extLst>
               <a:ext uri="{FF2B5EF4-FFF2-40B4-BE49-F238E27FC236}">
-                <a16:creationId xmlns:a16="http://schemas.microsoft.com/office/drawing/2014/main" id="{D1B1F0B0-195E-44FF-9FE8-2C14F77C75A9}"/>
+                <a16:creationId xmlns:a16="http://schemas.microsoft.com/office/drawing/2014/main" xmlns="" id="{D1B1F0B0-195E-44FF-9FE8-2C14F77C75A9}"/>
               </a:ext>
             </a:extLst>
           </p:cNvPr>
@@ -6195,6 +6351,10 @@
               </a:rPr>
               <a:t>Quem criou o HTML?</a:t>
             </a:r>
+            <a:r>
+              <a:rPr lang="pt-BR" dirty="0"/>
+              <a:t/>
+            </a:r>
             <a:br>
               <a:rPr lang="pt-BR" dirty="0"/>
             </a:br>
@@ -6207,7 +6367,7 @@
           <p:cNvPr id="3" name="Espaço Reservado para Conteúdo 2">
             <a:extLst>
               <a:ext uri="{FF2B5EF4-FFF2-40B4-BE49-F238E27FC236}">
-                <a16:creationId xmlns:a16="http://schemas.microsoft.com/office/drawing/2014/main" id="{25F51067-9DE2-417E-A2D3-D1008DDCBCD3}"/>
+                <a16:creationId xmlns:a16="http://schemas.microsoft.com/office/drawing/2014/main" xmlns="" id="{25F51067-9DE2-417E-A2D3-D1008DDCBCD3}"/>
               </a:ext>
             </a:extLst>
           </p:cNvPr>
@@ -6265,7 +6425,7 @@
           <p:cNvPr id="5" name="Imagem 4">
             <a:extLst>
               <a:ext uri="{FF2B5EF4-FFF2-40B4-BE49-F238E27FC236}">
-                <a16:creationId xmlns:a16="http://schemas.microsoft.com/office/drawing/2014/main" id="{4C0993AD-2306-480C-A8C8-65740E862503}"/>
+                <a16:creationId xmlns:a16="http://schemas.microsoft.com/office/drawing/2014/main" xmlns="" id="{4C0993AD-2306-480C-A8C8-65740E862503}"/>
               </a:ext>
             </a:extLst>
           </p:cNvPr>
@@ -6325,7 +6485,7 @@
           <p:cNvPr id="2" name="Título 1">
             <a:extLst>
               <a:ext uri="{FF2B5EF4-FFF2-40B4-BE49-F238E27FC236}">
-                <a16:creationId xmlns:a16="http://schemas.microsoft.com/office/drawing/2014/main" id="{988FFFEE-6FD0-4E01-8F3F-CCF4C07CE507}"/>
+                <a16:creationId xmlns:a16="http://schemas.microsoft.com/office/drawing/2014/main" xmlns="" id="{988FFFEE-6FD0-4E01-8F3F-CCF4C07CE507}"/>
               </a:ext>
             </a:extLst>
           </p:cNvPr>
@@ -6367,6 +6527,10 @@
               </a:rPr>
               <a:t> do HTML?</a:t>
             </a:r>
+            <a:r>
+              <a:rPr lang="pt-BR" dirty="0"/>
+              <a:t/>
+            </a:r>
             <a:br>
               <a:rPr lang="pt-BR" dirty="0"/>
             </a:br>
@@ -6379,7 +6543,7 @@
           <p:cNvPr id="3" name="Espaço Reservado para Conteúdo 2">
             <a:extLst>
               <a:ext uri="{FF2B5EF4-FFF2-40B4-BE49-F238E27FC236}">
-                <a16:creationId xmlns:a16="http://schemas.microsoft.com/office/drawing/2014/main" id="{62201322-9CC8-452A-A59A-2E7E86A4C8D3}"/>
+                <a16:creationId xmlns:a16="http://schemas.microsoft.com/office/drawing/2014/main" xmlns="" id="{62201322-9CC8-452A-A59A-2E7E86A4C8D3}"/>
               </a:ext>
             </a:extLst>
           </p:cNvPr>
@@ -6453,7 +6617,7 @@
           <p:cNvPr id="4" name="Imagem 3">
             <a:extLst>
               <a:ext uri="{FF2B5EF4-FFF2-40B4-BE49-F238E27FC236}">
-                <a16:creationId xmlns:a16="http://schemas.microsoft.com/office/drawing/2014/main" id="{6EA6536B-375C-45D4-835C-DECA4FC0EDFC}"/>
+                <a16:creationId xmlns:a16="http://schemas.microsoft.com/office/drawing/2014/main" xmlns="" id="{6EA6536B-375C-45D4-835C-DECA4FC0EDFC}"/>
               </a:ext>
             </a:extLst>
           </p:cNvPr>
@@ -6513,7 +6677,7 @@
           <p:cNvPr id="2" name="Título 1">
             <a:extLst>
               <a:ext uri="{FF2B5EF4-FFF2-40B4-BE49-F238E27FC236}">
-                <a16:creationId xmlns:a16="http://schemas.microsoft.com/office/drawing/2014/main" id="{8CF63340-C742-4275-A7D4-B182074C5D1F}"/>
+                <a16:creationId xmlns:a16="http://schemas.microsoft.com/office/drawing/2014/main" xmlns="" id="{8CF63340-C742-4275-A7D4-B182074C5D1F}"/>
               </a:ext>
             </a:extLst>
           </p:cNvPr>
@@ -6549,7 +6713,7 @@
           <p:cNvPr id="3" name="Espaço Reservado para Conteúdo 2">
             <a:extLst>
               <a:ext uri="{FF2B5EF4-FFF2-40B4-BE49-F238E27FC236}">
-                <a16:creationId xmlns:a16="http://schemas.microsoft.com/office/drawing/2014/main" id="{CFF2D1EB-B1FC-4D6E-B4B3-851E6CB70C1B}"/>
+                <a16:creationId xmlns:a16="http://schemas.microsoft.com/office/drawing/2014/main" xmlns="" id="{CFF2D1EB-B1FC-4D6E-B4B3-851E6CB70C1B}"/>
               </a:ext>
             </a:extLst>
           </p:cNvPr>
@@ -6585,7 +6749,7 @@
           <p:cNvPr id="4" name="Imagem 3">
             <a:extLst>
               <a:ext uri="{FF2B5EF4-FFF2-40B4-BE49-F238E27FC236}">
-                <a16:creationId xmlns:a16="http://schemas.microsoft.com/office/drawing/2014/main" id="{E9400F4B-F9DD-47A1-85CE-FCD9D4EE8485}"/>
+                <a16:creationId xmlns:a16="http://schemas.microsoft.com/office/drawing/2014/main" xmlns="" id="{E9400F4B-F9DD-47A1-85CE-FCD9D4EE8485}"/>
               </a:ext>
             </a:extLst>
           </p:cNvPr>
@@ -6645,7 +6809,7 @@
           <p:cNvPr id="2" name="Título 1">
             <a:extLst>
               <a:ext uri="{FF2B5EF4-FFF2-40B4-BE49-F238E27FC236}">
-                <a16:creationId xmlns:a16="http://schemas.microsoft.com/office/drawing/2014/main" id="{BCFACDBB-4416-485D-82BE-D9254C5578A0}"/>
+                <a16:creationId xmlns:a16="http://schemas.microsoft.com/office/drawing/2014/main" xmlns="" id="{BCFACDBB-4416-485D-82BE-D9254C5578A0}"/>
               </a:ext>
             </a:extLst>
           </p:cNvPr>
@@ -6678,7 +6842,7 @@
           <p:cNvPr id="3" name="Espaço Reservado para Conteúdo 2">
             <a:extLst>
               <a:ext uri="{FF2B5EF4-FFF2-40B4-BE49-F238E27FC236}">
-                <a16:creationId xmlns:a16="http://schemas.microsoft.com/office/drawing/2014/main" id="{ACDE9EC6-BAA9-4BA9-BF28-FF7D66BE49F2}"/>
+                <a16:creationId xmlns:a16="http://schemas.microsoft.com/office/drawing/2014/main" xmlns="" id="{ACDE9EC6-BAA9-4BA9-BF28-FF7D66BE49F2}"/>
               </a:ext>
             </a:extLst>
           </p:cNvPr>
@@ -6767,7 +6931,7 @@
           <p:cNvPr id="5" name="Imagem 4">
             <a:extLst>
               <a:ext uri="{FF2B5EF4-FFF2-40B4-BE49-F238E27FC236}">
-                <a16:creationId xmlns:a16="http://schemas.microsoft.com/office/drawing/2014/main" id="{B655BAE4-206A-49DA-99A7-B2BCFA89518E}"/>
+                <a16:creationId xmlns:a16="http://schemas.microsoft.com/office/drawing/2014/main" xmlns="" id="{B655BAE4-206A-49DA-99A7-B2BCFA89518E}"/>
               </a:ext>
             </a:extLst>
           </p:cNvPr>
@@ -6827,7 +6991,7 @@
           <p:cNvPr id="2" name="Título 1">
             <a:extLst>
               <a:ext uri="{FF2B5EF4-FFF2-40B4-BE49-F238E27FC236}">
-                <a16:creationId xmlns:a16="http://schemas.microsoft.com/office/drawing/2014/main" id="{1EFB8197-FC86-4A5F-A597-76DE9D0A0174}"/>
+                <a16:creationId xmlns:a16="http://schemas.microsoft.com/office/drawing/2014/main" xmlns="" id="{1EFB8197-FC86-4A5F-A597-76DE9D0A0174}"/>
               </a:ext>
             </a:extLst>
           </p:cNvPr>
@@ -6863,7 +7027,7 @@
           <p:cNvPr id="3" name="Espaço Reservado para Conteúdo 2">
             <a:extLst>
               <a:ext uri="{FF2B5EF4-FFF2-40B4-BE49-F238E27FC236}">
-                <a16:creationId xmlns:a16="http://schemas.microsoft.com/office/drawing/2014/main" id="{560DBE7F-2EDA-423F-B995-A41223BBD9C1}"/>
+                <a16:creationId xmlns:a16="http://schemas.microsoft.com/office/drawing/2014/main" xmlns="" id="{560DBE7F-2EDA-423F-B995-A41223BBD9C1}"/>
               </a:ext>
             </a:extLst>
           </p:cNvPr>
@@ -6935,7 +7099,7 @@
           <p:cNvPr id="5" name="Imagem 4">
             <a:extLst>
               <a:ext uri="{FF2B5EF4-FFF2-40B4-BE49-F238E27FC236}">
-                <a16:creationId xmlns:a16="http://schemas.microsoft.com/office/drawing/2014/main" id="{04B1A880-BF75-4521-A6AC-852160D011CC}"/>
+                <a16:creationId xmlns:a16="http://schemas.microsoft.com/office/drawing/2014/main" xmlns="" id="{04B1A880-BF75-4521-A6AC-852160D011CC}"/>
               </a:ext>
             </a:extLst>
           </p:cNvPr>
@@ -6995,7 +7159,7 @@
           <p:cNvPr id="2" name="Título 1">
             <a:extLst>
               <a:ext uri="{FF2B5EF4-FFF2-40B4-BE49-F238E27FC236}">
-                <a16:creationId xmlns:a16="http://schemas.microsoft.com/office/drawing/2014/main" id="{53C9886D-84E5-494F-A2E0-A7245C7B605F}"/>
+                <a16:creationId xmlns:a16="http://schemas.microsoft.com/office/drawing/2014/main" xmlns="" id="{53C9886D-84E5-494F-A2E0-A7245C7B605F}"/>
               </a:ext>
             </a:extLst>
           </p:cNvPr>
@@ -7031,7 +7195,7 @@
           <p:cNvPr id="3" name="Espaço Reservado para Conteúdo 2">
             <a:extLst>
               <a:ext uri="{FF2B5EF4-FFF2-40B4-BE49-F238E27FC236}">
-                <a16:creationId xmlns:a16="http://schemas.microsoft.com/office/drawing/2014/main" id="{E737B5DE-8A09-4F77-9A2E-9F8246042B26}"/>
+                <a16:creationId xmlns:a16="http://schemas.microsoft.com/office/drawing/2014/main" xmlns="" id="{E737B5DE-8A09-4F77-9A2E-9F8246042B26}"/>
               </a:ext>
             </a:extLst>
           </p:cNvPr>
@@ -7183,7 +7347,7 @@
           <p:cNvPr id="2" name="Título 1">
             <a:extLst>
               <a:ext uri="{FF2B5EF4-FFF2-40B4-BE49-F238E27FC236}">
-                <a16:creationId xmlns:a16="http://schemas.microsoft.com/office/drawing/2014/main" id="{BA67AD5D-4A4A-411B-A690-51D43DA7B6B1}"/>
+                <a16:creationId xmlns:a16="http://schemas.microsoft.com/office/drawing/2014/main" xmlns="" id="{BA67AD5D-4A4A-411B-A690-51D43DA7B6B1}"/>
               </a:ext>
             </a:extLst>
           </p:cNvPr>
@@ -7219,7 +7383,7 @@
           <p:cNvPr id="3" name="Espaço Reservado para Conteúdo 2">
             <a:extLst>
               <a:ext uri="{FF2B5EF4-FFF2-40B4-BE49-F238E27FC236}">
-                <a16:creationId xmlns:a16="http://schemas.microsoft.com/office/drawing/2014/main" id="{750B78C4-E833-4484-B793-74AC209FABB2}"/>
+                <a16:creationId xmlns:a16="http://schemas.microsoft.com/office/drawing/2014/main" xmlns="" id="{750B78C4-E833-4484-B793-74AC209FABB2}"/>
               </a:ext>
             </a:extLst>
           </p:cNvPr>

</xml_diff>